<commit_message>
Added README.md and ppt
</commit_message>
<xml_diff>
--- a/SanikaDalvi/Mini-project/PensionManagementSystem/Pension_Management_System.pptx
+++ b/SanikaDalvi/Mini-project/PensionManagementSystem/Pension_Management_System.pptx
@@ -19,6 +19,15 @@
     <p:sldId id="267" r:id="rId14"/>
     <p:sldId id="268" r:id="rId15"/>
     <p:sldId id="269" r:id="rId16"/>
+    <p:sldId id="270" r:id="rId17"/>
+    <p:sldId id="271" r:id="rId18"/>
+    <p:sldId id="272" r:id="rId19"/>
+    <p:sldId id="273" r:id="rId20"/>
+    <p:sldId id="274" r:id="rId21"/>
+    <p:sldId id="275" r:id="rId22"/>
+    <p:sldId id="276" r:id="rId23"/>
+    <p:sldId id="277" r:id="rId24"/>
+    <p:sldId id="278" r:id="rId25"/>
   </p:sldIdLst>
   <p:sldSz cx="9144000" cy="6858000" type="screen4x3"/>
   <p:notesSz cx="6858000" cy="9144000"/>
@@ -174,7 +183,7 @@
   </p:cSld>
   <p:clrMap bg1="lt1" tx1="dk1" bg2="lt2" tx2="dk2" accent1="accent1" accent2="accent2" accent3="accent3" accent4="accent4" accent5="accent5" accent6="accent6" hlink="hlink" folHlink="folHlink"/>
   <p:sldLayoutIdLst>
-    <p:sldLayoutId id="2357682281" r:id="rId1"/>
+    <p:sldLayoutId id="2357727673" r:id="rId1"/>
   </p:sldLayoutIdLst>
   <p:txStyles>
     <p:titleStyle>
@@ -505,6 +514,251 @@
 </p:sld>
 </file>
 
+<file path=ppt/slides/slide15.xml><?xml version="1.0" encoding="utf-8"?>
+<p:sld xmlns:a="http://schemas.openxmlformats.org/drawingml/2006/main" xmlns:r="http://schemas.openxmlformats.org/officeDocument/2006/relationships" xmlns:p="http://schemas.openxmlformats.org/presentationml/2006/main">
+  <p:cSld>
+    <p:spTree>
+      <p:nvGrpSpPr>
+        <p:cNvPr id="1" name=""/>
+        <p:cNvGrpSpPr/>
+        <p:nvPr/>
+      </p:nvGrpSpPr>
+      <p:grpSpPr>
+        <a:xfrm>
+          <a:off x="0" y="866775"/>
+          <a:ext cx="9144000" cy="6010275"/>
+          <a:chOff x="0" y="866775"/>
+          <a:chExt cx="9144000" cy="6010275"/>
+        </a:xfrm>
+      </p:grpSpPr>
+      <p:pic>
+        <p:nvPicPr>
+          <p:cNvPr id="1" name="Slide" descr=""/>
+          <p:cNvPicPr>
+            <a:picLocks noChangeAspect="1"/>
+          </p:cNvPicPr>
+          <p:nvPr/>
+        </p:nvPicPr>
+        <p:blipFill>
+          <a:blip r:embed="rId2"/>
+          <a:stretch>
+            <a:fillRect/>
+          </a:stretch>
+        </p:blipFill>
+        <p:spPr>
+          <a:xfrm>
+            <a:off x="0" y="866775"/>
+            <a:ext cx="9144000" cy="5143500"/>
+          </a:xfrm>
+          <a:prstGeom prst="rect">
+            <a:avLst/>
+          </a:prstGeom>
+        </p:spPr>
+      </p:pic>
+    </p:spTree>
+  </p:cSld>
+  <p:clrMapOvr>
+    <a:masterClrMapping/>
+  </p:clrMapOvr>
+</p:sld>
+</file>
+
+<file path=ppt/slides/slide16.xml><?xml version="1.0" encoding="utf-8"?>
+<p:sld xmlns:a="http://schemas.openxmlformats.org/drawingml/2006/main" xmlns:r="http://schemas.openxmlformats.org/officeDocument/2006/relationships" xmlns:p="http://schemas.openxmlformats.org/presentationml/2006/main">
+  <p:cSld>
+    <p:spTree>
+      <p:nvGrpSpPr>
+        <p:cNvPr id="1" name=""/>
+        <p:cNvGrpSpPr/>
+        <p:nvPr/>
+      </p:nvGrpSpPr>
+      <p:grpSpPr>
+        <a:xfrm>
+          <a:off x="0" y="866775"/>
+          <a:ext cx="9144000" cy="6010275"/>
+          <a:chOff x="0" y="866775"/>
+          <a:chExt cx="9144000" cy="6010275"/>
+        </a:xfrm>
+      </p:grpSpPr>
+      <p:pic>
+        <p:nvPicPr>
+          <p:cNvPr id="1" name="Slide" descr=""/>
+          <p:cNvPicPr>
+            <a:picLocks noChangeAspect="1"/>
+          </p:cNvPicPr>
+          <p:nvPr/>
+        </p:nvPicPr>
+        <p:blipFill>
+          <a:blip r:embed="rId2"/>
+          <a:stretch>
+            <a:fillRect/>
+          </a:stretch>
+        </p:blipFill>
+        <p:spPr>
+          <a:xfrm>
+            <a:off x="0" y="866775"/>
+            <a:ext cx="9144000" cy="5143500"/>
+          </a:xfrm>
+          <a:prstGeom prst="rect">
+            <a:avLst/>
+          </a:prstGeom>
+        </p:spPr>
+      </p:pic>
+    </p:spTree>
+  </p:cSld>
+  <p:clrMapOvr>
+    <a:masterClrMapping/>
+  </p:clrMapOvr>
+</p:sld>
+</file>
+
+<file path=ppt/slides/slide17.xml><?xml version="1.0" encoding="utf-8"?>
+<p:sld xmlns:a="http://schemas.openxmlformats.org/drawingml/2006/main" xmlns:r="http://schemas.openxmlformats.org/officeDocument/2006/relationships" xmlns:p="http://schemas.openxmlformats.org/presentationml/2006/main">
+  <p:cSld>
+    <p:spTree>
+      <p:nvGrpSpPr>
+        <p:cNvPr id="1" name=""/>
+        <p:cNvGrpSpPr/>
+        <p:nvPr/>
+      </p:nvGrpSpPr>
+      <p:grpSpPr>
+        <a:xfrm>
+          <a:off x="0" y="866775"/>
+          <a:ext cx="9144000" cy="6010275"/>
+          <a:chOff x="0" y="866775"/>
+          <a:chExt cx="9144000" cy="6010275"/>
+        </a:xfrm>
+      </p:grpSpPr>
+      <p:pic>
+        <p:nvPicPr>
+          <p:cNvPr id="1" name="Slide" descr=""/>
+          <p:cNvPicPr>
+            <a:picLocks noChangeAspect="1"/>
+          </p:cNvPicPr>
+          <p:nvPr/>
+        </p:nvPicPr>
+        <p:blipFill>
+          <a:blip r:embed="rId2"/>
+          <a:stretch>
+            <a:fillRect/>
+          </a:stretch>
+        </p:blipFill>
+        <p:spPr>
+          <a:xfrm>
+            <a:off x="0" y="866775"/>
+            <a:ext cx="9144000" cy="5143500"/>
+          </a:xfrm>
+          <a:prstGeom prst="rect">
+            <a:avLst/>
+          </a:prstGeom>
+        </p:spPr>
+      </p:pic>
+    </p:spTree>
+  </p:cSld>
+  <p:clrMapOvr>
+    <a:masterClrMapping/>
+  </p:clrMapOvr>
+</p:sld>
+</file>
+
+<file path=ppt/slides/slide18.xml><?xml version="1.0" encoding="utf-8"?>
+<p:sld xmlns:a="http://schemas.openxmlformats.org/drawingml/2006/main" xmlns:r="http://schemas.openxmlformats.org/officeDocument/2006/relationships" xmlns:p="http://schemas.openxmlformats.org/presentationml/2006/main">
+  <p:cSld>
+    <p:spTree>
+      <p:nvGrpSpPr>
+        <p:cNvPr id="1" name=""/>
+        <p:cNvGrpSpPr/>
+        <p:nvPr/>
+      </p:nvGrpSpPr>
+      <p:grpSpPr>
+        <a:xfrm>
+          <a:off x="0" y="866775"/>
+          <a:ext cx="9144000" cy="6010275"/>
+          <a:chOff x="0" y="866775"/>
+          <a:chExt cx="9144000" cy="6010275"/>
+        </a:xfrm>
+      </p:grpSpPr>
+      <p:pic>
+        <p:nvPicPr>
+          <p:cNvPr id="1" name="Slide" descr=""/>
+          <p:cNvPicPr>
+            <a:picLocks noChangeAspect="1"/>
+          </p:cNvPicPr>
+          <p:nvPr/>
+        </p:nvPicPr>
+        <p:blipFill>
+          <a:blip r:embed="rId2"/>
+          <a:stretch>
+            <a:fillRect/>
+          </a:stretch>
+        </p:blipFill>
+        <p:spPr>
+          <a:xfrm>
+            <a:off x="0" y="866775"/>
+            <a:ext cx="9144000" cy="5143500"/>
+          </a:xfrm>
+          <a:prstGeom prst="rect">
+            <a:avLst/>
+          </a:prstGeom>
+        </p:spPr>
+      </p:pic>
+    </p:spTree>
+  </p:cSld>
+  <p:clrMapOvr>
+    <a:masterClrMapping/>
+  </p:clrMapOvr>
+</p:sld>
+</file>
+
+<file path=ppt/slides/slide19.xml><?xml version="1.0" encoding="utf-8"?>
+<p:sld xmlns:a="http://schemas.openxmlformats.org/drawingml/2006/main" xmlns:r="http://schemas.openxmlformats.org/officeDocument/2006/relationships" xmlns:p="http://schemas.openxmlformats.org/presentationml/2006/main">
+  <p:cSld>
+    <p:spTree>
+      <p:nvGrpSpPr>
+        <p:cNvPr id="1" name=""/>
+        <p:cNvGrpSpPr/>
+        <p:nvPr/>
+      </p:nvGrpSpPr>
+      <p:grpSpPr>
+        <a:xfrm>
+          <a:off x="0" y="866775"/>
+          <a:ext cx="9144000" cy="6010275"/>
+          <a:chOff x="0" y="866775"/>
+          <a:chExt cx="9144000" cy="6010275"/>
+        </a:xfrm>
+      </p:grpSpPr>
+      <p:pic>
+        <p:nvPicPr>
+          <p:cNvPr id="1" name="Slide" descr=""/>
+          <p:cNvPicPr>
+            <a:picLocks noChangeAspect="1"/>
+          </p:cNvPicPr>
+          <p:nvPr/>
+        </p:nvPicPr>
+        <p:blipFill>
+          <a:blip r:embed="rId2"/>
+          <a:stretch>
+            <a:fillRect/>
+          </a:stretch>
+        </p:blipFill>
+        <p:spPr>
+          <a:xfrm>
+            <a:off x="0" y="866775"/>
+            <a:ext cx="9144000" cy="5143500"/>
+          </a:xfrm>
+          <a:prstGeom prst="rect">
+            <a:avLst/>
+          </a:prstGeom>
+        </p:spPr>
+      </p:pic>
+    </p:spTree>
+  </p:cSld>
+  <p:clrMapOvr>
+    <a:masterClrMapping/>
+  </p:clrMapOvr>
+</p:sld>
+</file>
+
 <file path=ppt/slides/slide2.xml><?xml version="1.0" encoding="utf-8"?>
 <p:sld xmlns:a="http://schemas.openxmlformats.org/drawingml/2006/main" xmlns:r="http://schemas.openxmlformats.org/officeDocument/2006/relationships" xmlns:p="http://schemas.openxmlformats.org/presentationml/2006/main">
   <p:cSld>
@@ -554,6 +808,202 @@
 </p:sld>
 </file>
 
+<file path=ppt/slides/slide20.xml><?xml version="1.0" encoding="utf-8"?>
+<p:sld xmlns:a="http://schemas.openxmlformats.org/drawingml/2006/main" xmlns:r="http://schemas.openxmlformats.org/officeDocument/2006/relationships" xmlns:p="http://schemas.openxmlformats.org/presentationml/2006/main">
+  <p:cSld>
+    <p:spTree>
+      <p:nvGrpSpPr>
+        <p:cNvPr id="1" name=""/>
+        <p:cNvGrpSpPr/>
+        <p:nvPr/>
+      </p:nvGrpSpPr>
+      <p:grpSpPr>
+        <a:xfrm>
+          <a:off x="0" y="866775"/>
+          <a:ext cx="9144000" cy="6010275"/>
+          <a:chOff x="0" y="866775"/>
+          <a:chExt cx="9144000" cy="6010275"/>
+        </a:xfrm>
+      </p:grpSpPr>
+      <p:pic>
+        <p:nvPicPr>
+          <p:cNvPr id="1" name="Slide" descr=""/>
+          <p:cNvPicPr>
+            <a:picLocks noChangeAspect="1"/>
+          </p:cNvPicPr>
+          <p:nvPr/>
+        </p:nvPicPr>
+        <p:blipFill>
+          <a:blip r:embed="rId2"/>
+          <a:stretch>
+            <a:fillRect/>
+          </a:stretch>
+        </p:blipFill>
+        <p:spPr>
+          <a:xfrm>
+            <a:off x="0" y="866775"/>
+            <a:ext cx="9144000" cy="5143500"/>
+          </a:xfrm>
+          <a:prstGeom prst="rect">
+            <a:avLst/>
+          </a:prstGeom>
+        </p:spPr>
+      </p:pic>
+    </p:spTree>
+  </p:cSld>
+  <p:clrMapOvr>
+    <a:masterClrMapping/>
+  </p:clrMapOvr>
+</p:sld>
+</file>
+
+<file path=ppt/slides/slide21.xml><?xml version="1.0" encoding="utf-8"?>
+<p:sld xmlns:a="http://schemas.openxmlformats.org/drawingml/2006/main" xmlns:r="http://schemas.openxmlformats.org/officeDocument/2006/relationships" xmlns:p="http://schemas.openxmlformats.org/presentationml/2006/main">
+  <p:cSld>
+    <p:spTree>
+      <p:nvGrpSpPr>
+        <p:cNvPr id="1" name=""/>
+        <p:cNvGrpSpPr/>
+        <p:nvPr/>
+      </p:nvGrpSpPr>
+      <p:grpSpPr>
+        <a:xfrm>
+          <a:off x="0" y="866775"/>
+          <a:ext cx="9144000" cy="6010275"/>
+          <a:chOff x="0" y="866775"/>
+          <a:chExt cx="9144000" cy="6010275"/>
+        </a:xfrm>
+      </p:grpSpPr>
+      <p:pic>
+        <p:nvPicPr>
+          <p:cNvPr id="1" name="Slide" descr=""/>
+          <p:cNvPicPr>
+            <a:picLocks noChangeAspect="1"/>
+          </p:cNvPicPr>
+          <p:nvPr/>
+        </p:nvPicPr>
+        <p:blipFill>
+          <a:blip r:embed="rId2"/>
+          <a:stretch>
+            <a:fillRect/>
+          </a:stretch>
+        </p:blipFill>
+        <p:spPr>
+          <a:xfrm>
+            <a:off x="0" y="866775"/>
+            <a:ext cx="9144000" cy="5143500"/>
+          </a:xfrm>
+          <a:prstGeom prst="rect">
+            <a:avLst/>
+          </a:prstGeom>
+        </p:spPr>
+      </p:pic>
+    </p:spTree>
+  </p:cSld>
+  <p:clrMapOvr>
+    <a:masterClrMapping/>
+  </p:clrMapOvr>
+</p:sld>
+</file>
+
+<file path=ppt/slides/slide22.xml><?xml version="1.0" encoding="utf-8"?>
+<p:sld xmlns:a="http://schemas.openxmlformats.org/drawingml/2006/main" xmlns:r="http://schemas.openxmlformats.org/officeDocument/2006/relationships" xmlns:p="http://schemas.openxmlformats.org/presentationml/2006/main">
+  <p:cSld>
+    <p:spTree>
+      <p:nvGrpSpPr>
+        <p:cNvPr id="1" name=""/>
+        <p:cNvGrpSpPr/>
+        <p:nvPr/>
+      </p:nvGrpSpPr>
+      <p:grpSpPr>
+        <a:xfrm>
+          <a:off x="0" y="866775"/>
+          <a:ext cx="9144000" cy="6010275"/>
+          <a:chOff x="0" y="866775"/>
+          <a:chExt cx="9144000" cy="6010275"/>
+        </a:xfrm>
+      </p:grpSpPr>
+      <p:pic>
+        <p:nvPicPr>
+          <p:cNvPr id="1" name="Slide" descr=""/>
+          <p:cNvPicPr>
+            <a:picLocks noChangeAspect="1"/>
+          </p:cNvPicPr>
+          <p:nvPr/>
+        </p:nvPicPr>
+        <p:blipFill>
+          <a:blip r:embed="rId2"/>
+          <a:stretch>
+            <a:fillRect/>
+          </a:stretch>
+        </p:blipFill>
+        <p:spPr>
+          <a:xfrm>
+            <a:off x="0" y="866775"/>
+            <a:ext cx="9144000" cy="5143500"/>
+          </a:xfrm>
+          <a:prstGeom prst="rect">
+            <a:avLst/>
+          </a:prstGeom>
+        </p:spPr>
+      </p:pic>
+    </p:spTree>
+  </p:cSld>
+  <p:clrMapOvr>
+    <a:masterClrMapping/>
+  </p:clrMapOvr>
+</p:sld>
+</file>
+
+<file path=ppt/slides/slide23.xml><?xml version="1.0" encoding="utf-8"?>
+<p:sld xmlns:a="http://schemas.openxmlformats.org/drawingml/2006/main" xmlns:r="http://schemas.openxmlformats.org/officeDocument/2006/relationships" xmlns:p="http://schemas.openxmlformats.org/presentationml/2006/main">
+  <p:cSld>
+    <p:spTree>
+      <p:nvGrpSpPr>
+        <p:cNvPr id="1" name=""/>
+        <p:cNvGrpSpPr/>
+        <p:nvPr/>
+      </p:nvGrpSpPr>
+      <p:grpSpPr>
+        <a:xfrm>
+          <a:off x="0" y="866775"/>
+          <a:ext cx="9144000" cy="6010275"/>
+          <a:chOff x="0" y="866775"/>
+          <a:chExt cx="9144000" cy="6010275"/>
+        </a:xfrm>
+      </p:grpSpPr>
+      <p:pic>
+        <p:nvPicPr>
+          <p:cNvPr id="1" name="Slide" descr=""/>
+          <p:cNvPicPr>
+            <a:picLocks noChangeAspect="1"/>
+          </p:cNvPicPr>
+          <p:nvPr/>
+        </p:nvPicPr>
+        <p:blipFill>
+          <a:blip r:embed="rId2"/>
+          <a:stretch>
+            <a:fillRect/>
+          </a:stretch>
+        </p:blipFill>
+        <p:spPr>
+          <a:xfrm>
+            <a:off x="0" y="866775"/>
+            <a:ext cx="9144000" cy="5143500"/>
+          </a:xfrm>
+          <a:prstGeom prst="rect">
+            <a:avLst/>
+          </a:prstGeom>
+        </p:spPr>
+      </p:pic>
+    </p:spTree>
+  </p:cSld>
+  <p:clrMapOvr>
+    <a:masterClrMapping/>
+  </p:clrMapOvr>
+</p:sld>
+</file>
+
 <file path=ppt/slides/slide3.xml><?xml version="1.0" encoding="utf-8"?>
 <p:sld xmlns:a="http://schemas.openxmlformats.org/drawingml/2006/main" xmlns:r="http://schemas.openxmlformats.org/officeDocument/2006/relationships" xmlns:p="http://schemas.openxmlformats.org/presentationml/2006/main">
   <p:cSld>
@@ -898,9 +1348,9 @@
 </file>
 
 <file path=ppt/theme/theme1.xml><?xml version="1.0" encoding="utf-8"?>
-<a:theme xmlns:a="http://schemas.openxmlformats.org/drawingml/2006/main" name="Theme20">
+<a:theme xmlns:a="http://schemas.openxmlformats.org/drawingml/2006/main" name="Theme69">
   <a:themeElements>
-    <a:clrScheme name="Theme20">
+    <a:clrScheme name="Theme69">
       <a:dk1>
         <a:sysClr val="windowText" lastClr="000000"/>
       </a:dk1>
@@ -938,7 +1388,7 @@
         <a:srgbClr val="800080"/>
       </a:folHlink>
     </a:clrScheme>
-    <a:fontScheme name="Theme20">
+    <a:fontScheme name="Theme69">
       <a:majorFont>
         <a:latin typeface="Calibri"/>
         <a:ea typeface=""/>
@@ -1008,7 +1458,7 @@
         <a:font script="Uigh" typeface="Microsoft Uighur"/>
       </a:minorFont>
     </a:fontScheme>
-    <a:fmtScheme name="Theme20">
+    <a:fmtScheme name="Theme69">
       <a:fillStyleLst>
         <a:solidFill>
           <a:schemeClr val="phClr"/>

</xml_diff>